<commit_message>
:memo: doc & demo
</commit_message>
<xml_diff>
--- a/ppt/lazy-evaluation.pptx
+++ b/ppt/lazy-evaluation.pptx
@@ -20,8 +20,8 @@
     <p:sldId id="333" r:id="rId11"/>
     <p:sldId id="335" r:id="rId12"/>
     <p:sldId id="334" r:id="rId13"/>
-    <p:sldId id="336" r:id="rId14"/>
-    <p:sldId id="338" r:id="rId15"/>
+    <p:sldId id="338" r:id="rId14"/>
+    <p:sldId id="336" r:id="rId15"/>
     <p:sldId id="339" r:id="rId16"/>
     <p:sldId id="340" r:id="rId17"/>
     <p:sldId id="342" r:id="rId18"/>
@@ -751,6 +751,306 @@
     <p:extLst>
       <p:ext uri="{BB962C8B-B14F-4D97-AF65-F5344CB8AC3E}">
         <p14:creationId xmlns:p14="http://schemas.microsoft.com/office/powerpoint/2010/main" val="15211775"/>
+      </p:ext>
+    </p:extLst>
+  </p:cSld>
+  <p:clrMapOvr>
+    <a:masterClrMapping/>
+  </p:clrMapOvr>
+</p:notes>
+</file>
+
+<file path=ppt/notesSlides/notesSlide4.xml><?xml version="1.0" encoding="utf-8"?>
+<p:notes xmlns:a="http://schemas.openxmlformats.org/drawingml/2006/main" xmlns:r="http://schemas.openxmlformats.org/officeDocument/2006/relationships" xmlns:p="http://schemas.openxmlformats.org/presentationml/2006/main">
+  <p:cSld>
+    <p:spTree>
+      <p:nvGrpSpPr>
+        <p:cNvPr id="1" name=""/>
+        <p:cNvGrpSpPr/>
+        <p:nvPr/>
+      </p:nvGrpSpPr>
+      <p:grpSpPr>
+        <a:xfrm>
+          <a:off x="0" y="0"/>
+          <a:ext cx="0" cy="0"/>
+          <a:chOff x="0" y="0"/>
+          <a:chExt cx="0" cy="0"/>
+        </a:xfrm>
+      </p:grpSpPr>
+      <p:sp>
+        <p:nvSpPr>
+          <p:cNvPr id="2" name="幻灯片图像占位符 1"/>
+          <p:cNvSpPr>
+            <a:spLocks noGrp="1" noRot="1" noChangeAspect="1"/>
+          </p:cNvSpPr>
+          <p:nvPr>
+            <p:ph type="sldImg"/>
+          </p:nvPr>
+        </p:nvSpPr>
+        <p:spPr/>
+      </p:sp>
+      <p:sp>
+        <p:nvSpPr>
+          <p:cNvPr id="3" name="备注占位符 2"/>
+          <p:cNvSpPr>
+            <a:spLocks noGrp="1"/>
+          </p:cNvSpPr>
+          <p:nvPr>
+            <p:ph type="body" idx="1"/>
+          </p:nvPr>
+        </p:nvSpPr>
+        <p:spPr/>
+        <p:txBody>
+          <a:bodyPr/>
+          <a:lstStyle/>
+          <a:p>
+            <a:r>
+              <a:rPr kumimoji="1" lang="zh-Hans" altLang="en-US" dirty="0"/>
+              <a:t>来源：</a:t>
+            </a:r>
+            <a:r>
+              <a:rPr kumimoji="1" lang="en-US" altLang="zh-Hans" dirty="0"/>
+              <a:t>《JavaScript</a:t>
+            </a:r>
+            <a:r>
+              <a:rPr kumimoji="1" lang="zh-Hans" altLang="en-US"/>
+              <a:t> </a:t>
+            </a:r>
+            <a:r>
+              <a:rPr kumimoji="1" lang="zh-Hans" altLang="en-US" dirty="0"/>
+              <a:t>面向对象编程指南</a:t>
+            </a:r>
+            <a:r>
+              <a:rPr kumimoji="1" lang="en-US" altLang="zh-Hans" dirty="0"/>
+              <a:t>》</a:t>
+            </a:r>
+            <a:endParaRPr kumimoji="1" lang="zh-CN" altLang="en-US" dirty="0"/>
+          </a:p>
+        </p:txBody>
+      </p:sp>
+      <p:sp>
+        <p:nvSpPr>
+          <p:cNvPr id="4" name="幻灯片编号占位符 3"/>
+          <p:cNvSpPr>
+            <a:spLocks noGrp="1"/>
+          </p:cNvSpPr>
+          <p:nvPr>
+            <p:ph type="sldNum" sz="quarter" idx="10"/>
+          </p:nvPr>
+        </p:nvSpPr>
+        <p:spPr/>
+        <p:txBody>
+          <a:bodyPr/>
+          <a:lstStyle/>
+          <a:p>
+            <a:fld id="{2F4D0FD1-AC6E-43E8-952D-4C48F08D37DA}" type="slidenum">
+              <a:rPr lang="zh-CN" altLang="en-US" smtClean="0"/>
+              <a:t>9</a:t>
+            </a:fld>
+            <a:endParaRPr lang="zh-CN" altLang="en-US"/>
+          </a:p>
+        </p:txBody>
+      </p:sp>
+    </p:spTree>
+    <p:extLst>
+      <p:ext uri="{BB962C8B-B14F-4D97-AF65-F5344CB8AC3E}">
+        <p14:creationId xmlns:p14="http://schemas.microsoft.com/office/powerpoint/2010/main" val="1559198797"/>
+      </p:ext>
+    </p:extLst>
+  </p:cSld>
+  <p:clrMapOvr>
+    <a:masterClrMapping/>
+  </p:clrMapOvr>
+</p:notes>
+</file>
+
+<file path=ppt/notesSlides/notesSlide5.xml><?xml version="1.0" encoding="utf-8"?>
+<p:notes xmlns:a="http://schemas.openxmlformats.org/drawingml/2006/main" xmlns:r="http://schemas.openxmlformats.org/officeDocument/2006/relationships" xmlns:p="http://schemas.openxmlformats.org/presentationml/2006/main">
+  <p:cSld>
+    <p:spTree>
+      <p:nvGrpSpPr>
+        <p:cNvPr id="1" name=""/>
+        <p:cNvGrpSpPr/>
+        <p:nvPr/>
+      </p:nvGrpSpPr>
+      <p:grpSpPr>
+        <a:xfrm>
+          <a:off x="0" y="0"/>
+          <a:ext cx="0" cy="0"/>
+          <a:chOff x="0" y="0"/>
+          <a:chExt cx="0" cy="0"/>
+        </a:xfrm>
+      </p:grpSpPr>
+      <p:sp>
+        <p:nvSpPr>
+          <p:cNvPr id="2" name="幻灯片图像占位符 1"/>
+          <p:cNvSpPr>
+            <a:spLocks noGrp="1" noRot="1" noChangeAspect="1"/>
+          </p:cNvSpPr>
+          <p:nvPr>
+            <p:ph type="sldImg"/>
+          </p:nvPr>
+        </p:nvSpPr>
+        <p:spPr/>
+      </p:sp>
+      <p:sp>
+        <p:nvSpPr>
+          <p:cNvPr id="3" name="备注占位符 2"/>
+          <p:cNvSpPr>
+            <a:spLocks noGrp="1"/>
+          </p:cNvSpPr>
+          <p:nvPr>
+            <p:ph type="body" idx="1"/>
+          </p:nvPr>
+        </p:nvSpPr>
+        <p:spPr/>
+        <p:txBody>
+          <a:bodyPr/>
+          <a:lstStyle/>
+          <a:p>
+            <a:r>
+              <a:rPr kumimoji="1" lang="en-US" altLang="zh-CN" dirty="0"/>
+              <a:t>《</a:t>
+            </a:r>
+            <a:r>
+              <a:rPr kumimoji="1" lang="en-US" altLang="zh-Hans" dirty="0"/>
+              <a:t>ECMAScript</a:t>
+            </a:r>
+            <a:r>
+              <a:rPr kumimoji="1" lang="zh-Hans" altLang="en-US" dirty="0"/>
+              <a:t> </a:t>
+            </a:r>
+            <a:r>
+              <a:rPr kumimoji="1" lang="en-US" altLang="zh-Hans" dirty="0"/>
+              <a:t>6</a:t>
+            </a:r>
+            <a:r>
+              <a:rPr kumimoji="1" lang="zh-Hans" altLang="en-US" dirty="0"/>
+              <a:t> 入门</a:t>
+            </a:r>
+            <a:r>
+              <a:rPr kumimoji="1" lang="en-US" altLang="zh-Hans" dirty="0"/>
+              <a:t>》</a:t>
+            </a:r>
+            <a:r>
+              <a:rPr kumimoji="1" lang="zh-Hans" altLang="en-US" dirty="0"/>
+              <a:t>函数的扩展</a:t>
+            </a:r>
+            <a:endParaRPr kumimoji="1" lang="zh-CN" altLang="en-US" dirty="0"/>
+          </a:p>
+        </p:txBody>
+      </p:sp>
+      <p:sp>
+        <p:nvSpPr>
+          <p:cNvPr id="4" name="幻灯片编号占位符 3"/>
+          <p:cNvSpPr>
+            <a:spLocks noGrp="1"/>
+          </p:cNvSpPr>
+          <p:nvPr>
+            <p:ph type="sldNum" sz="quarter" idx="10"/>
+          </p:nvPr>
+        </p:nvSpPr>
+        <p:spPr/>
+        <p:txBody>
+          <a:bodyPr/>
+          <a:lstStyle/>
+          <a:p>
+            <a:fld id="{2F4D0FD1-AC6E-43E8-952D-4C48F08D37DA}" type="slidenum">
+              <a:rPr lang="zh-CN" altLang="en-US" smtClean="0"/>
+              <a:t>10</a:t>
+            </a:fld>
+            <a:endParaRPr lang="zh-CN" altLang="en-US"/>
+          </a:p>
+        </p:txBody>
+      </p:sp>
+    </p:spTree>
+    <p:extLst>
+      <p:ext uri="{BB962C8B-B14F-4D97-AF65-F5344CB8AC3E}">
+        <p14:creationId xmlns:p14="http://schemas.microsoft.com/office/powerpoint/2010/main" val="2256942785"/>
+      </p:ext>
+    </p:extLst>
+  </p:cSld>
+  <p:clrMapOvr>
+    <a:masterClrMapping/>
+  </p:clrMapOvr>
+</p:notes>
+</file>
+
+<file path=ppt/notesSlides/notesSlide6.xml><?xml version="1.0" encoding="utf-8"?>
+<p:notes xmlns:a="http://schemas.openxmlformats.org/drawingml/2006/main" xmlns:r="http://schemas.openxmlformats.org/officeDocument/2006/relationships" xmlns:p="http://schemas.openxmlformats.org/presentationml/2006/main">
+  <p:cSld>
+    <p:spTree>
+      <p:nvGrpSpPr>
+        <p:cNvPr id="1" name=""/>
+        <p:cNvGrpSpPr/>
+        <p:nvPr/>
+      </p:nvGrpSpPr>
+      <p:grpSpPr>
+        <a:xfrm>
+          <a:off x="0" y="0"/>
+          <a:ext cx="0" cy="0"/>
+          <a:chOff x="0" y="0"/>
+          <a:chExt cx="0" cy="0"/>
+        </a:xfrm>
+      </p:grpSpPr>
+      <p:sp>
+        <p:nvSpPr>
+          <p:cNvPr id="2" name="幻灯片图像占位符 1"/>
+          <p:cNvSpPr>
+            <a:spLocks noGrp="1" noRot="1" noChangeAspect="1"/>
+          </p:cNvSpPr>
+          <p:nvPr>
+            <p:ph type="sldImg"/>
+          </p:nvPr>
+        </p:nvSpPr>
+        <p:spPr/>
+      </p:sp>
+      <p:sp>
+        <p:nvSpPr>
+          <p:cNvPr id="3" name="备注占位符 2"/>
+          <p:cNvSpPr>
+            <a:spLocks noGrp="1"/>
+          </p:cNvSpPr>
+          <p:nvPr>
+            <p:ph type="body" idx="1"/>
+          </p:nvPr>
+        </p:nvSpPr>
+        <p:spPr/>
+        <p:txBody>
+          <a:bodyPr/>
+          <a:lstStyle/>
+          <a:p>
+            <a:endParaRPr kumimoji="1" lang="zh-CN" altLang="en-US" dirty="0"/>
+          </a:p>
+        </p:txBody>
+      </p:sp>
+      <p:sp>
+        <p:nvSpPr>
+          <p:cNvPr id="4" name="幻灯片编号占位符 3"/>
+          <p:cNvSpPr>
+            <a:spLocks noGrp="1"/>
+          </p:cNvSpPr>
+          <p:nvPr>
+            <p:ph type="sldNum" sz="quarter" idx="10"/>
+          </p:nvPr>
+        </p:nvSpPr>
+        <p:spPr/>
+        <p:txBody>
+          <a:bodyPr/>
+          <a:lstStyle/>
+          <a:p>
+            <a:fld id="{2F4D0FD1-AC6E-43E8-952D-4C48F08D37DA}" type="slidenum">
+              <a:rPr lang="zh-CN" altLang="en-US" smtClean="0"/>
+              <a:t>18</a:t>
+            </a:fld>
+            <a:endParaRPr lang="zh-CN" altLang="en-US"/>
+          </a:p>
+        </p:txBody>
+      </p:sp>
+    </p:spTree>
+    <p:extLst>
+      <p:ext uri="{BB962C8B-B14F-4D97-AF65-F5344CB8AC3E}">
+        <p14:creationId xmlns:p14="http://schemas.microsoft.com/office/powerpoint/2010/main" val="4237844460"/>
       </p:ext>
     </p:extLst>
   </p:cSld>
@@ -4106,7 +4406,7 @@
           </p:nvPr>
         </p:nvPicPr>
         <p:blipFill>
-          <a:blip r:embed="rId2">
+          <a:blip r:embed="rId3">
             <a:extLst>
               <a:ext uri="{28A0092B-C50C-407E-A947-70E740481C1C}">
                 <a14:useLocalDpi xmlns:a14="http://schemas.microsoft.com/office/drawing/2010/main" val="0"/>
@@ -4337,19 +4637,18 @@
           <a:lstStyle/>
           <a:p>
             <a:r>
-              <a:rPr kumimoji="1" lang="en-US" altLang="zh-CN" dirty="0"/>
-              <a:t>memoize.js</a:t>
-            </a:r>
-            <a:endParaRPr kumimoji="1" lang="zh-CN" altLang="en-US" dirty="0"/>
+              <a:rPr kumimoji="1" lang="zh-CN" altLang="en-US" dirty="0"/>
+              <a:t>示例一（优化版）：</a:t>
+            </a:r>
           </a:p>
         </p:txBody>
       </p:sp>
       <p:pic>
         <p:nvPicPr>
-          <p:cNvPr id="5" name="内容占位符 4">
-            <a:extLst>
-              <a:ext uri="{FF2B5EF4-FFF2-40B4-BE49-F238E27FC236}">
-                <a16:creationId xmlns:a16="http://schemas.microsoft.com/office/drawing/2014/main" id="{3F6F2589-A83E-4221-B047-4CCDCB83F7B4}"/>
+          <p:cNvPr id="6" name="内容占位符 5">
+            <a:extLst>
+              <a:ext uri="{FF2B5EF4-FFF2-40B4-BE49-F238E27FC236}">
+                <a16:creationId xmlns:a16="http://schemas.microsoft.com/office/drawing/2014/main" id="{ED91C1EB-6A84-4969-AEF2-C25622C43148}"/>
               </a:ext>
             </a:extLst>
           </p:cNvPr>
@@ -4374,15 +4673,15 @@
         </p:blipFill>
         <p:spPr>
           <a:xfrm>
-            <a:off x="2865066" y="1825625"/>
-            <a:ext cx="6461867" cy="4351338"/>
+            <a:off x="1053328" y="1825625"/>
+            <a:ext cx="10085344" cy="4351338"/>
           </a:xfrm>
         </p:spPr>
       </p:pic>
     </p:spTree>
     <p:extLst>
       <p:ext uri="{BB962C8B-B14F-4D97-AF65-F5344CB8AC3E}">
-        <p14:creationId xmlns:p14="http://schemas.microsoft.com/office/powerpoint/2010/main" val="3447013144"/>
+        <p14:creationId xmlns:p14="http://schemas.microsoft.com/office/powerpoint/2010/main" val="2414212367"/>
       </p:ext>
     </p:extLst>
   </p:cSld>
@@ -4431,18 +4730,19 @@
           <a:lstStyle/>
           <a:p>
             <a:r>
-              <a:rPr kumimoji="1" lang="zh-CN" altLang="en-US" dirty="0"/>
-              <a:t>示例一（优化版）：</a:t>
-            </a:r>
+              <a:rPr kumimoji="1" lang="en-US" altLang="zh-CN" dirty="0"/>
+              <a:t>memoize.js</a:t>
+            </a:r>
+            <a:endParaRPr kumimoji="1" lang="zh-CN" altLang="en-US" dirty="0"/>
           </a:p>
         </p:txBody>
       </p:sp>
       <p:pic>
         <p:nvPicPr>
-          <p:cNvPr id="6" name="内容占位符 5">
-            <a:extLst>
-              <a:ext uri="{FF2B5EF4-FFF2-40B4-BE49-F238E27FC236}">
-                <a16:creationId xmlns:a16="http://schemas.microsoft.com/office/drawing/2014/main" id="{ED91C1EB-6A84-4969-AEF2-C25622C43148}"/>
+          <p:cNvPr id="5" name="内容占位符 4">
+            <a:extLst>
+              <a:ext uri="{FF2B5EF4-FFF2-40B4-BE49-F238E27FC236}">
+                <a16:creationId xmlns:a16="http://schemas.microsoft.com/office/drawing/2014/main" id="{3F6F2589-A83E-4221-B047-4CCDCB83F7B4}"/>
               </a:ext>
             </a:extLst>
           </p:cNvPr>
@@ -4467,15 +4767,15 @@
         </p:blipFill>
         <p:spPr>
           <a:xfrm>
-            <a:off x="1053328" y="1825625"/>
-            <a:ext cx="10085344" cy="4351338"/>
+            <a:off x="2865066" y="1825625"/>
+            <a:ext cx="6461867" cy="4351338"/>
           </a:xfrm>
         </p:spPr>
       </p:pic>
     </p:spTree>
     <p:extLst>
       <p:ext uri="{BB962C8B-B14F-4D97-AF65-F5344CB8AC3E}">
-        <p14:creationId xmlns:p14="http://schemas.microsoft.com/office/powerpoint/2010/main" val="2414212367"/>
+        <p14:creationId xmlns:p14="http://schemas.microsoft.com/office/powerpoint/2010/main" val="3447013144"/>
       </p:ext>
     </p:extLst>
   </p:cSld>
@@ -4685,6 +4985,10 @@
           <a:lstStyle/>
           <a:p>
             <a:r>
+              <a:rPr lang="zh-Hans" altLang="en-US" dirty="0"/>
+              <a:t>回到</a:t>
+            </a:r>
+            <a:r>
               <a:rPr lang="zh-CN" altLang="en-US" dirty="0"/>
               <a:t>最初的问题：</a:t>
             </a:r>
@@ -4778,8 +5082,12 @@
           <a:lstStyle/>
           <a:p>
             <a:r>
+              <a:rPr lang="zh-Hans" altLang="en-US" dirty="0"/>
+              <a:t>方法一（函数式迭代）</a:t>
+            </a:r>
+            <a:r>
               <a:rPr lang="zh-CN" altLang="en-US" dirty="0"/>
-              <a:t>立马想到：</a:t>
+              <a:t>：</a:t>
             </a:r>
           </a:p>
         </p:txBody>
@@ -4801,7 +5109,7 @@
           </p:nvPr>
         </p:nvPicPr>
         <p:blipFill>
-          <a:blip r:embed="rId2">
+          <a:blip r:embed="rId3">
             <a:extLst>
               <a:ext uri="{28A0092B-C50C-407E-A947-70E740481C1C}">
                 <a14:useLocalDpi xmlns:a14="http://schemas.microsoft.com/office/drawing/2010/main" val="0"/>
@@ -4871,8 +5179,16 @@
           <a:lstStyle/>
           <a:p>
             <a:r>
+              <a:rPr lang="zh-Hans" altLang="en-US" dirty="0"/>
+              <a:t>方法二（</a:t>
+            </a:r>
+            <a:r>
               <a:rPr lang="en-US" altLang="zh-CN" dirty="0"/>
-              <a:t>loop</a:t>
+              <a:t> loop </a:t>
+            </a:r>
+            <a:r>
+              <a:rPr lang="zh-Hans" altLang="en-US" dirty="0"/>
+              <a:t>）</a:t>
             </a:r>
             <a:r>
               <a:rPr lang="zh-CN" altLang="en-US" dirty="0"/>
@@ -5028,12 +5344,12 @@
               </a:lnSpc>
             </a:pPr>
             <a:r>
-              <a:rPr kumimoji="1" lang="en-US" altLang="zh-CN" dirty="0"/>
-              <a:t>JS </a:t>
-            </a:r>
-            <a:r>
-              <a:rPr kumimoji="1" lang="zh-CN" altLang="en-US" dirty="0"/>
-              <a:t>中的惰性求值</a:t>
+              <a:rPr kumimoji="1" lang="zh-Hans" altLang="en-US" dirty="0"/>
+              <a:t>懒惰的 </a:t>
+            </a:r>
+            <a:r>
+              <a:rPr kumimoji="1" lang="en-US" altLang="zh-Hans" dirty="0"/>
+              <a:t>JS</a:t>
             </a:r>
             <a:endParaRPr kumimoji="1" lang="en-US" altLang="zh-CN" dirty="0"/>
           </a:p>
@@ -5145,8 +5461,24 @@
           <a:lstStyle/>
           <a:p>
             <a:r>
+              <a:rPr lang="zh-Hans" altLang="en-US" dirty="0"/>
+              <a:t>方法三（</a:t>
+            </a:r>
+            <a:r>
+              <a:rPr lang="en-US" altLang="zh-CN" dirty="0"/>
+              <a:t> </a:t>
+            </a:r>
+            <a:r>
               <a:rPr lang="en-US" altLang="zh-CN" dirty="0" err="1"/>
               <a:t>lodash</a:t>
+            </a:r>
+            <a:r>
+              <a:rPr lang="en-US" altLang="zh-CN" dirty="0"/>
+              <a:t> </a:t>
+            </a:r>
+            <a:r>
+              <a:rPr lang="zh-Hans" altLang="en-US" dirty="0"/>
+              <a:t>）</a:t>
             </a:r>
             <a:r>
               <a:rPr lang="zh-CN" altLang="en-US" dirty="0"/>
@@ -6018,13 +6350,14 @@
               </a:lnSpc>
             </a:pPr>
             <a:r>
+              <a:rPr kumimoji="1" lang="zh-Hans" altLang="en-US" dirty="0"/>
+              <a:t>懒惰的 </a:t>
+            </a:r>
+            <a:r>
               <a:rPr kumimoji="1" lang="en-US" altLang="zh-CN" dirty="0"/>
-              <a:t>JS </a:t>
-            </a:r>
-            <a:r>
-              <a:rPr kumimoji="1" lang="zh-CN" altLang="en-US" dirty="0"/>
-              <a:t>中的惰性求值</a:t>
-            </a:r>
+              <a:t>JS</a:t>
+            </a:r>
+            <a:endParaRPr kumimoji="1" lang="zh-CN" altLang="en-US" dirty="0"/>
           </a:p>
         </p:txBody>
       </p:sp>
@@ -6074,7 +6407,12 @@
             <p:ph type="title"/>
           </p:nvPr>
         </p:nvSpPr>
-        <p:spPr/>
+        <p:spPr>
+          <a:xfrm>
+            <a:off x="838200" y="365125"/>
+            <a:ext cx="10515600" cy="1325563"/>
+          </a:xfrm>
+        </p:spPr>
         <p:txBody>
           <a:bodyPr/>
           <a:lstStyle/>
@@ -6103,7 +6441,7 @@
           </p:nvPr>
         </p:nvPicPr>
         <p:blipFill>
-          <a:blip r:embed="rId2">
+          <a:blip r:embed="rId3">
             <a:extLst>
               <a:ext uri="{28A0092B-C50C-407E-A947-70E740481C1C}">
                 <a14:useLocalDpi xmlns:a14="http://schemas.microsoft.com/office/drawing/2010/main" val="0"/>

</xml_diff>